<commit_message>
add ai platform presentation
</commit_message>
<xml_diff>
--- a/Parallel programming/presentation AI Platform/AI Platform Shevchenko MI-4.pptx
+++ b/Parallel programming/presentation AI Platform/AI Platform Shevchenko MI-4.pptx
@@ -14,6 +14,16 @@
     <p:sldId id="266" r:id="rId8"/>
     <p:sldId id="267" r:id="rId9"/>
     <p:sldId id="268" r:id="rId10"/>
+    <p:sldId id="270" r:id="rId11"/>
+    <p:sldId id="271" r:id="rId12"/>
+    <p:sldId id="272" r:id="rId13"/>
+    <p:sldId id="273" r:id="rId14"/>
+    <p:sldId id="274" r:id="rId15"/>
+    <p:sldId id="275" r:id="rId16"/>
+    <p:sldId id="276" r:id="rId17"/>
+    <p:sldId id="277" r:id="rId18"/>
+    <p:sldId id="278" r:id="rId19"/>
+    <p:sldId id="279" r:id="rId20"/>
   </p:sldIdLst>
   <p:sldSz cx="12192000" cy="6858000"/>
   <p:notesSz cx="6858000" cy="9144000"/>
@@ -523,7 +533,7 @@
           <a:p>
             <a:fld id="{83284890-85D2-4D7B-8EF5-15A9C1DB8F42}" type="datetimeFigureOut">
               <a:rPr lang="en-US" dirty="0"/>
-              <a:t>3/31/2021</a:t>
+              <a:t>4/12/2021</a:t>
             </a:fld>
             <a:endParaRPr lang="en-US" dirty="0"/>
           </a:p>
@@ -701,7 +711,7 @@
           <a:p>
             <a:fld id="{87157CC2-0FC8-4686-B024-99790E0F5162}" type="datetimeFigureOut">
               <a:rPr lang="en-US" dirty="0"/>
-              <a:t>3/31/2021</a:t>
+              <a:t>4/12/2021</a:t>
             </a:fld>
             <a:endParaRPr lang="en-US" dirty="0"/>
           </a:p>
@@ -879,7 +889,7 @@
           <a:p>
             <a:fld id="{F6764DA5-CD3D-4590-A511-FCD3BC7A793E}" type="datetimeFigureOut">
               <a:rPr lang="en-US" dirty="0"/>
-              <a:t>3/31/2021</a:t>
+              <a:t>4/12/2021</a:t>
             </a:fld>
             <a:endParaRPr lang="en-US" dirty="0"/>
           </a:p>
@@ -1047,7 +1057,7 @@
           <a:p>
             <a:fld id="{82F5661D-6934-4B32-B92C-470368BF1EC6}" type="datetimeFigureOut">
               <a:rPr lang="en-US" dirty="0"/>
-              <a:t>3/31/2021</a:t>
+              <a:t>4/12/2021</a:t>
             </a:fld>
             <a:endParaRPr lang="en-US" dirty="0"/>
           </a:p>
@@ -1358,7 +1368,7 @@
           <a:p>
             <a:fld id="{C6F822A4-8DA6-4447-9B1F-C5DB58435268}" type="datetimeFigureOut">
               <a:rPr lang="en-US" dirty="0"/>
-              <a:t>3/31/2021</a:t>
+              <a:t>4/12/2021</a:t>
             </a:fld>
             <a:endParaRPr lang="en-US" dirty="0"/>
           </a:p>
@@ -1743,7 +1753,7 @@
           <a:p>
             <a:fld id="{E548D31E-DCDA-41A7-9C67-C4B11B94D21D}" type="datetimeFigureOut">
               <a:rPr lang="en-US" dirty="0"/>
-              <a:t>3/31/2021</a:t>
+              <a:t>4/12/2021</a:t>
             </a:fld>
             <a:endParaRPr lang="en-US" dirty="0"/>
           </a:p>
@@ -2175,7 +2185,7 @@
           <a:p>
             <a:fld id="{9B3762C0-B258-48F1-ADE6-176B4174CCDD}" type="datetimeFigureOut">
               <a:rPr lang="en-US" dirty="0"/>
-              <a:t>3/31/2021</a:t>
+              <a:t>4/12/2021</a:t>
             </a:fld>
             <a:endParaRPr lang="en-US" dirty="0"/>
           </a:p>
@@ -2291,7 +2301,7 @@
           <a:p>
             <a:fld id="{677919A6-33EB-49BD-A62F-1FA56B9F9712}" type="datetimeFigureOut">
               <a:rPr lang="en-US" dirty="0"/>
-              <a:t>3/31/2021</a:t>
+              <a:t>4/12/2021</a:t>
             </a:fld>
             <a:endParaRPr lang="en-US" dirty="0"/>
           </a:p>
@@ -2384,7 +2394,7 @@
           <a:p>
             <a:fld id="{CA4E7D1B-D673-4CF6-8672-009D42ABD2A0}" type="datetimeFigureOut">
               <a:rPr lang="en-US" dirty="0"/>
-              <a:t>3/31/2021</a:t>
+              <a:t>4/12/2021</a:t>
             </a:fld>
             <a:endParaRPr lang="en-US" dirty="0"/>
           </a:p>
@@ -2732,7 +2742,7 @@
           <a:p>
             <a:fld id="{DA16AA21-1863-4931-97CB-99D0A168701B}" type="datetimeFigureOut">
               <a:rPr lang="en-US" dirty="0"/>
-              <a:t>3/31/2021</a:t>
+              <a:t>4/12/2021</a:t>
             </a:fld>
             <a:endParaRPr lang="en-US" dirty="0"/>
           </a:p>
@@ -3155,7 +3165,7 @@
           <a:p>
             <a:fld id="{3772C379-9A7C-4C87-A116-CBE9F58B04C5}" type="datetimeFigureOut">
               <a:rPr lang="en-US" dirty="0"/>
-              <a:t>3/31/2021</a:t>
+              <a:t>4/12/2021</a:t>
             </a:fld>
             <a:endParaRPr lang="en-US" dirty="0"/>
           </a:p>
@@ -3434,7 +3444,7 @@
           <a:p>
             <a:fld id="{8664C608-40B1-4030-A28D-5B74BC98ADCE}" type="datetimeFigureOut">
               <a:rPr lang="en-US" dirty="0"/>
-              <a:t>3/31/2021</a:t>
+              <a:t>4/12/2021</a:t>
             </a:fld>
             <a:endParaRPr lang="en-US" dirty="0"/>
           </a:p>
@@ -4097,6 +4107,1489 @@
 </p:sld>
 </file>
 
+<file path=ppt/slides/slide10.xml><?xml version="1.0" encoding="utf-8"?>
+<p:sld xmlns:a="http://schemas.openxmlformats.org/drawingml/2006/main" xmlns:r="http://schemas.openxmlformats.org/officeDocument/2006/relationships" xmlns:p="http://schemas.openxmlformats.org/presentationml/2006/main">
+  <p:cSld>
+    <p:spTree>
+      <p:nvGrpSpPr>
+        <p:cNvPr id="1" name=""/>
+        <p:cNvGrpSpPr/>
+        <p:nvPr/>
+      </p:nvGrpSpPr>
+      <p:grpSpPr>
+        <a:xfrm>
+          <a:off x="0" y="0"/>
+          <a:ext cx="0" cy="0"/>
+          <a:chOff x="0" y="0"/>
+          <a:chExt cx="0" cy="0"/>
+        </a:xfrm>
+      </p:grpSpPr>
+      <p:sp>
+        <p:nvSpPr>
+          <p:cNvPr id="2" name="Заголовок 1">
+            <a:extLst>
+              <a:ext uri="{FF2B5EF4-FFF2-40B4-BE49-F238E27FC236}">
+                <a16:creationId xmlns:a16="http://schemas.microsoft.com/office/drawing/2014/main" id="{49978B9A-413C-44A9-94B3-6288FC8371C4}"/>
+              </a:ext>
+            </a:extLst>
+          </p:cNvPr>
+          <p:cNvSpPr>
+            <a:spLocks noGrp="1"/>
+          </p:cNvSpPr>
+          <p:nvPr>
+            <p:ph type="ctrTitle"/>
+          </p:nvPr>
+        </p:nvSpPr>
+        <p:spPr/>
+        <p:txBody>
+          <a:bodyPr/>
+          <a:lstStyle/>
+          <a:p>
+            <a:r>
+              <a:rPr lang="en-US" dirty="0"/>
+              <a:t>Simple project</a:t>
+            </a:r>
+            <a:endParaRPr lang="uk-UA" dirty="0"/>
+          </a:p>
+        </p:txBody>
+      </p:sp>
+      <p:sp>
+        <p:nvSpPr>
+          <p:cNvPr id="3" name="Підзаголовок 2">
+            <a:extLst>
+              <a:ext uri="{FF2B5EF4-FFF2-40B4-BE49-F238E27FC236}">
+                <a16:creationId xmlns:a16="http://schemas.microsoft.com/office/drawing/2014/main" id="{10D99AE7-E83A-4997-ADAF-9086366E5071}"/>
+              </a:ext>
+            </a:extLst>
+          </p:cNvPr>
+          <p:cNvSpPr>
+            <a:spLocks noGrp="1"/>
+          </p:cNvSpPr>
+          <p:nvPr>
+            <p:ph type="subTitle" idx="1"/>
+          </p:nvPr>
+        </p:nvSpPr>
+        <p:spPr/>
+        <p:txBody>
+          <a:bodyPr/>
+          <a:lstStyle/>
+          <a:p>
+            <a:pPr algn="r"/>
+            <a:r>
+              <a:rPr lang="en-US" dirty="0"/>
+              <a:t>classification using </a:t>
+            </a:r>
+            <a:r>
+              <a:rPr lang="en-US" dirty="0" err="1"/>
+              <a:t>builted</a:t>
+            </a:r>
+            <a:r>
+              <a:rPr lang="en-US" dirty="0"/>
+              <a:t>-in algorithm</a:t>
+            </a:r>
+            <a:endParaRPr lang="uk-UA" dirty="0"/>
+          </a:p>
+        </p:txBody>
+      </p:sp>
+    </p:spTree>
+    <p:extLst>
+      <p:ext uri="{BB962C8B-B14F-4D97-AF65-F5344CB8AC3E}">
+        <p14:creationId xmlns:p14="http://schemas.microsoft.com/office/powerpoint/2010/main" val="108471788"/>
+      </p:ext>
+    </p:extLst>
+  </p:cSld>
+  <p:clrMapOvr>
+    <a:masterClrMapping/>
+  </p:clrMapOvr>
+  <p:transition spd="slow">
+    <p:push dir="u"/>
+  </p:transition>
+</p:sld>
+</file>
+
+<file path=ppt/slides/slide11.xml><?xml version="1.0" encoding="utf-8"?>
+<p:sld xmlns:a="http://schemas.openxmlformats.org/drawingml/2006/main" xmlns:r="http://schemas.openxmlformats.org/officeDocument/2006/relationships" xmlns:p="http://schemas.openxmlformats.org/presentationml/2006/main">
+  <p:cSld>
+    <p:spTree>
+      <p:nvGrpSpPr>
+        <p:cNvPr id="1" name=""/>
+        <p:cNvGrpSpPr/>
+        <p:nvPr/>
+      </p:nvGrpSpPr>
+      <p:grpSpPr>
+        <a:xfrm>
+          <a:off x="0" y="0"/>
+          <a:ext cx="0" cy="0"/>
+          <a:chOff x="0" y="0"/>
+          <a:chExt cx="0" cy="0"/>
+        </a:xfrm>
+      </p:grpSpPr>
+      <p:sp>
+        <p:nvSpPr>
+          <p:cNvPr id="19" name="Заголовок 18">
+            <a:extLst>
+              <a:ext uri="{FF2B5EF4-FFF2-40B4-BE49-F238E27FC236}">
+                <a16:creationId xmlns:a16="http://schemas.microsoft.com/office/drawing/2014/main" id="{1EA49510-932D-40AB-822C-8325EB193FAF}"/>
+              </a:ext>
+            </a:extLst>
+          </p:cNvPr>
+          <p:cNvSpPr>
+            <a:spLocks noGrp="1"/>
+          </p:cNvSpPr>
+          <p:nvPr>
+            <p:ph type="title"/>
+          </p:nvPr>
+        </p:nvSpPr>
+        <p:spPr/>
+        <p:txBody>
+          <a:bodyPr/>
+          <a:lstStyle/>
+          <a:p>
+            <a:r>
+              <a:rPr lang="en-US" dirty="0"/>
+              <a:t>Create new project and enable </a:t>
+            </a:r>
+            <a:r>
+              <a:rPr lang="en-US" dirty="0" err="1"/>
+              <a:t>api</a:t>
+            </a:r>
+            <a:endParaRPr lang="uk-UA" dirty="0"/>
+          </a:p>
+        </p:txBody>
+      </p:sp>
+      <p:pic>
+        <p:nvPicPr>
+          <p:cNvPr id="14" name="Місце для вмісту 13">
+            <a:extLst>
+              <a:ext uri="{FF2B5EF4-FFF2-40B4-BE49-F238E27FC236}">
+                <a16:creationId xmlns:a16="http://schemas.microsoft.com/office/drawing/2014/main" id="{A41F92B3-21BA-4BDA-B95E-52FF85059F25}"/>
+              </a:ext>
+            </a:extLst>
+          </p:cNvPr>
+          <p:cNvPicPr>
+            <a:picLocks noGrp="1" noChangeAspect="1"/>
+          </p:cNvPicPr>
+          <p:nvPr>
+            <p:ph idx="1"/>
+          </p:nvPr>
+        </p:nvPicPr>
+        <p:blipFill>
+          <a:blip r:embed="rId2"/>
+          <a:stretch>
+            <a:fillRect/>
+          </a:stretch>
+        </p:blipFill>
+        <p:spPr>
+          <a:xfrm>
+            <a:off x="241207" y="2738375"/>
+            <a:ext cx="5448300" cy="4051300"/>
+          </a:xfrm>
+        </p:spPr>
+      </p:pic>
+      <p:pic>
+        <p:nvPicPr>
+          <p:cNvPr id="12" name="Рисунок 11">
+            <a:extLst>
+              <a:ext uri="{FF2B5EF4-FFF2-40B4-BE49-F238E27FC236}">
+                <a16:creationId xmlns:a16="http://schemas.microsoft.com/office/drawing/2014/main" id="{C64F4639-419E-4148-9A1C-A185D99EAF14}"/>
+              </a:ext>
+            </a:extLst>
+          </p:cNvPr>
+          <p:cNvPicPr>
+            <a:picLocks noChangeAspect="1"/>
+          </p:cNvPicPr>
+          <p:nvPr/>
+        </p:nvPicPr>
+        <p:blipFill>
+          <a:blip r:embed="rId3"/>
+          <a:stretch>
+            <a:fillRect/>
+          </a:stretch>
+        </p:blipFill>
+        <p:spPr>
+          <a:xfrm>
+            <a:off x="241207" y="2180694"/>
+            <a:ext cx="1781424" cy="514422"/>
+          </a:xfrm>
+          <a:prstGeom prst="rect">
+            <a:avLst/>
+          </a:prstGeom>
+        </p:spPr>
+      </p:pic>
+      <p:pic>
+        <p:nvPicPr>
+          <p:cNvPr id="16" name="Рисунок 15">
+            <a:extLst>
+              <a:ext uri="{FF2B5EF4-FFF2-40B4-BE49-F238E27FC236}">
+                <a16:creationId xmlns:a16="http://schemas.microsoft.com/office/drawing/2014/main" id="{77E719FF-6583-4013-8DB5-85A043153057}"/>
+              </a:ext>
+            </a:extLst>
+          </p:cNvPr>
+          <p:cNvPicPr>
+            <a:picLocks noChangeAspect="1"/>
+          </p:cNvPicPr>
+          <p:nvPr/>
+        </p:nvPicPr>
+        <p:blipFill>
+          <a:blip r:embed="rId4"/>
+          <a:stretch>
+            <a:fillRect/>
+          </a:stretch>
+        </p:blipFill>
+        <p:spPr>
+          <a:xfrm>
+            <a:off x="4018409" y="2325871"/>
+            <a:ext cx="8173591" cy="800212"/>
+          </a:xfrm>
+          <a:prstGeom prst="rect">
+            <a:avLst/>
+          </a:prstGeom>
+        </p:spPr>
+      </p:pic>
+      <p:pic>
+        <p:nvPicPr>
+          <p:cNvPr id="18" name="Рисунок 17">
+            <a:extLst>
+              <a:ext uri="{FF2B5EF4-FFF2-40B4-BE49-F238E27FC236}">
+                <a16:creationId xmlns:a16="http://schemas.microsoft.com/office/drawing/2014/main" id="{D30CD141-59E4-4314-A0A5-12F9D923AC71}"/>
+              </a:ext>
+            </a:extLst>
+          </p:cNvPr>
+          <p:cNvPicPr>
+            <a:picLocks noChangeAspect="1"/>
+          </p:cNvPicPr>
+          <p:nvPr/>
+        </p:nvPicPr>
+        <p:blipFill>
+          <a:blip r:embed="rId5"/>
+          <a:stretch>
+            <a:fillRect/>
+          </a:stretch>
+        </p:blipFill>
+        <p:spPr>
+          <a:xfrm>
+            <a:off x="5582228" y="3357978"/>
+            <a:ext cx="6458851" cy="2295845"/>
+          </a:xfrm>
+          <a:prstGeom prst="rect">
+            <a:avLst/>
+          </a:prstGeom>
+        </p:spPr>
+      </p:pic>
+    </p:spTree>
+    <p:extLst>
+      <p:ext uri="{BB962C8B-B14F-4D97-AF65-F5344CB8AC3E}">
+        <p14:creationId xmlns:p14="http://schemas.microsoft.com/office/powerpoint/2010/main" val="134362336"/>
+      </p:ext>
+    </p:extLst>
+  </p:cSld>
+  <p:clrMapOvr>
+    <a:masterClrMapping/>
+  </p:clrMapOvr>
+  <p:transition spd="slow">
+    <p:push dir="u"/>
+  </p:transition>
+</p:sld>
+</file>
+
+<file path=ppt/slides/slide12.xml><?xml version="1.0" encoding="utf-8"?>
+<p:sld xmlns:a="http://schemas.openxmlformats.org/drawingml/2006/main" xmlns:r="http://schemas.openxmlformats.org/officeDocument/2006/relationships" xmlns:p="http://schemas.openxmlformats.org/presentationml/2006/main">
+  <p:cSld>
+    <p:spTree>
+      <p:nvGrpSpPr>
+        <p:cNvPr id="1" name=""/>
+        <p:cNvGrpSpPr/>
+        <p:nvPr/>
+      </p:nvGrpSpPr>
+      <p:grpSpPr>
+        <a:xfrm>
+          <a:off x="0" y="0"/>
+          <a:ext cx="0" cy="0"/>
+          <a:chOff x="0" y="0"/>
+          <a:chExt cx="0" cy="0"/>
+        </a:xfrm>
+      </p:grpSpPr>
+      <p:sp>
+        <p:nvSpPr>
+          <p:cNvPr id="2" name="Заголовок 1">
+            <a:extLst>
+              <a:ext uri="{FF2B5EF4-FFF2-40B4-BE49-F238E27FC236}">
+                <a16:creationId xmlns:a16="http://schemas.microsoft.com/office/drawing/2014/main" id="{19DFB7A8-A523-4FA5-A87B-1D2632E2C2CD}"/>
+              </a:ext>
+            </a:extLst>
+          </p:cNvPr>
+          <p:cNvSpPr>
+            <a:spLocks noGrp="1"/>
+          </p:cNvSpPr>
+          <p:nvPr>
+            <p:ph type="title"/>
+          </p:nvPr>
+        </p:nvSpPr>
+        <p:spPr/>
+        <p:txBody>
+          <a:bodyPr/>
+          <a:lstStyle/>
+          <a:p>
+            <a:r>
+              <a:rPr lang="en-US" dirty="0"/>
+              <a:t>Create service account</a:t>
+            </a:r>
+            <a:endParaRPr lang="uk-UA" dirty="0"/>
+          </a:p>
+        </p:txBody>
+      </p:sp>
+      <p:sp>
+        <p:nvSpPr>
+          <p:cNvPr id="3" name="Місце для вмісту 2">
+            <a:extLst>
+              <a:ext uri="{FF2B5EF4-FFF2-40B4-BE49-F238E27FC236}">
+                <a16:creationId xmlns:a16="http://schemas.microsoft.com/office/drawing/2014/main" id="{C4BE8AB1-5019-4261-B7F3-73AAB4A42B5B}"/>
+              </a:ext>
+            </a:extLst>
+          </p:cNvPr>
+          <p:cNvSpPr>
+            <a:spLocks noGrp="1"/>
+          </p:cNvSpPr>
+          <p:nvPr>
+            <p:ph idx="1"/>
+          </p:nvPr>
+        </p:nvSpPr>
+        <p:spPr>
+          <a:xfrm>
+            <a:off x="1066800" y="1562115"/>
+            <a:ext cx="10058400" cy="4050792"/>
+          </a:xfrm>
+        </p:spPr>
+        <p:txBody>
+          <a:bodyPr/>
+          <a:lstStyle/>
+          <a:p>
+            <a:r>
+              <a:rPr lang="en-US" dirty="0"/>
+              <a:t>Select ML Engine Admin and Storage Object Admin roles </a:t>
+            </a:r>
+            <a:endParaRPr lang="uk-UA" dirty="0"/>
+          </a:p>
+        </p:txBody>
+      </p:sp>
+      <p:pic>
+        <p:nvPicPr>
+          <p:cNvPr id="5" name="Рисунок 4">
+            <a:extLst>
+              <a:ext uri="{FF2B5EF4-FFF2-40B4-BE49-F238E27FC236}">
+                <a16:creationId xmlns:a16="http://schemas.microsoft.com/office/drawing/2014/main" id="{727B8FCC-07DA-4831-90BE-05E7B3ED4578}"/>
+              </a:ext>
+            </a:extLst>
+          </p:cNvPr>
+          <p:cNvPicPr>
+            <a:picLocks noChangeAspect="1"/>
+          </p:cNvPicPr>
+          <p:nvPr/>
+        </p:nvPicPr>
+        <p:blipFill>
+          <a:blip r:embed="rId2"/>
+          <a:stretch>
+            <a:fillRect/>
+          </a:stretch>
+        </p:blipFill>
+        <p:spPr>
+          <a:xfrm>
+            <a:off x="1200365" y="2093976"/>
+            <a:ext cx="6629740" cy="4452190"/>
+          </a:xfrm>
+          <a:prstGeom prst="rect">
+            <a:avLst/>
+          </a:prstGeom>
+        </p:spPr>
+      </p:pic>
+      <p:pic>
+        <p:nvPicPr>
+          <p:cNvPr id="7" name="Рисунок 6">
+            <a:extLst>
+              <a:ext uri="{FF2B5EF4-FFF2-40B4-BE49-F238E27FC236}">
+                <a16:creationId xmlns:a16="http://schemas.microsoft.com/office/drawing/2014/main" id="{8445858B-D430-40AC-8B0A-10266A853956}"/>
+              </a:ext>
+            </a:extLst>
+          </p:cNvPr>
+          <p:cNvPicPr>
+            <a:picLocks noChangeAspect="1"/>
+          </p:cNvPicPr>
+          <p:nvPr/>
+        </p:nvPicPr>
+        <p:blipFill>
+          <a:blip r:embed="rId3"/>
+          <a:stretch>
+            <a:fillRect/>
+          </a:stretch>
+        </p:blipFill>
+        <p:spPr>
+          <a:xfrm>
+            <a:off x="7560816" y="5220682"/>
+            <a:ext cx="2505425" cy="1152686"/>
+          </a:xfrm>
+          <a:prstGeom prst="rect">
+            <a:avLst/>
+          </a:prstGeom>
+        </p:spPr>
+      </p:pic>
+    </p:spTree>
+    <p:extLst>
+      <p:ext uri="{BB962C8B-B14F-4D97-AF65-F5344CB8AC3E}">
+        <p14:creationId xmlns:p14="http://schemas.microsoft.com/office/powerpoint/2010/main" val="2670789972"/>
+      </p:ext>
+    </p:extLst>
+  </p:cSld>
+  <p:clrMapOvr>
+    <a:masterClrMapping/>
+  </p:clrMapOvr>
+  <p:transition spd="slow">
+    <p:push dir="u"/>
+  </p:transition>
+</p:sld>
+</file>
+
+<file path=ppt/slides/slide13.xml><?xml version="1.0" encoding="utf-8"?>
+<p:sld xmlns:a="http://schemas.openxmlformats.org/drawingml/2006/main" xmlns:r="http://schemas.openxmlformats.org/officeDocument/2006/relationships" xmlns:p="http://schemas.openxmlformats.org/presentationml/2006/main">
+  <p:cSld>
+    <p:spTree>
+      <p:nvGrpSpPr>
+        <p:cNvPr id="1" name=""/>
+        <p:cNvGrpSpPr/>
+        <p:nvPr/>
+      </p:nvGrpSpPr>
+      <p:grpSpPr>
+        <a:xfrm>
+          <a:off x="0" y="0"/>
+          <a:ext cx="0" cy="0"/>
+          <a:chOff x="0" y="0"/>
+          <a:chExt cx="0" cy="0"/>
+        </a:xfrm>
+      </p:grpSpPr>
+      <p:sp>
+        <p:nvSpPr>
+          <p:cNvPr id="2" name="Заголовок 1">
+            <a:extLst>
+              <a:ext uri="{FF2B5EF4-FFF2-40B4-BE49-F238E27FC236}">
+                <a16:creationId xmlns:a16="http://schemas.microsoft.com/office/drawing/2014/main" id="{F3373187-B352-43EC-A381-668B7A10B948}"/>
+              </a:ext>
+            </a:extLst>
+          </p:cNvPr>
+          <p:cNvSpPr>
+            <a:spLocks noGrp="1"/>
+          </p:cNvSpPr>
+          <p:nvPr>
+            <p:ph type="title"/>
+          </p:nvPr>
+        </p:nvSpPr>
+        <p:spPr/>
+        <p:txBody>
+          <a:bodyPr/>
+          <a:lstStyle/>
+          <a:p>
+            <a:r>
+              <a:rPr lang="en-US" dirty="0"/>
+              <a:t>Create bucket</a:t>
+            </a:r>
+            <a:endParaRPr lang="uk-UA" dirty="0"/>
+          </a:p>
+        </p:txBody>
+      </p:sp>
+      <p:sp>
+        <p:nvSpPr>
+          <p:cNvPr id="7" name="Місце для вмісту 6">
+            <a:extLst>
+              <a:ext uri="{FF2B5EF4-FFF2-40B4-BE49-F238E27FC236}">
+                <a16:creationId xmlns:a16="http://schemas.microsoft.com/office/drawing/2014/main" id="{E0E4765C-F213-425C-BB58-597AF67D05B9}"/>
+              </a:ext>
+            </a:extLst>
+          </p:cNvPr>
+          <p:cNvSpPr>
+            <a:spLocks noGrp="1"/>
+          </p:cNvSpPr>
+          <p:nvPr>
+            <p:ph idx="1"/>
+          </p:nvPr>
+        </p:nvSpPr>
+        <p:spPr>
+          <a:xfrm>
+            <a:off x="1066800" y="1677525"/>
+            <a:ext cx="10058400" cy="4050792"/>
+          </a:xfrm>
+        </p:spPr>
+        <p:txBody>
+          <a:bodyPr/>
+          <a:lstStyle/>
+          <a:p>
+            <a:r>
+              <a:rPr lang="en-US" dirty="0"/>
+              <a:t>And load train and test data there</a:t>
+            </a:r>
+            <a:endParaRPr lang="uk-UA" dirty="0"/>
+          </a:p>
+        </p:txBody>
+      </p:sp>
+      <p:pic>
+        <p:nvPicPr>
+          <p:cNvPr id="9" name="Рисунок 8">
+            <a:extLst>
+              <a:ext uri="{FF2B5EF4-FFF2-40B4-BE49-F238E27FC236}">
+                <a16:creationId xmlns:a16="http://schemas.microsoft.com/office/drawing/2014/main" id="{ABB1E594-C318-4AAF-934F-2040C21EF833}"/>
+              </a:ext>
+            </a:extLst>
+          </p:cNvPr>
+          <p:cNvPicPr>
+            <a:picLocks noChangeAspect="1"/>
+          </p:cNvPicPr>
+          <p:nvPr/>
+        </p:nvPicPr>
+        <p:blipFill>
+          <a:blip r:embed="rId2"/>
+          <a:stretch>
+            <a:fillRect/>
+          </a:stretch>
+        </p:blipFill>
+        <p:spPr>
+          <a:xfrm>
+            <a:off x="1499546" y="2701302"/>
+            <a:ext cx="9192908" cy="2419688"/>
+          </a:xfrm>
+          <a:prstGeom prst="rect">
+            <a:avLst/>
+          </a:prstGeom>
+        </p:spPr>
+      </p:pic>
+    </p:spTree>
+    <p:extLst>
+      <p:ext uri="{BB962C8B-B14F-4D97-AF65-F5344CB8AC3E}">
+        <p14:creationId xmlns:p14="http://schemas.microsoft.com/office/powerpoint/2010/main" val="4084707286"/>
+      </p:ext>
+    </p:extLst>
+  </p:cSld>
+  <p:clrMapOvr>
+    <a:masterClrMapping/>
+  </p:clrMapOvr>
+  <p:transition spd="slow">
+    <p:push dir="u"/>
+  </p:transition>
+</p:sld>
+</file>
+
+<file path=ppt/slides/slide14.xml><?xml version="1.0" encoding="utf-8"?>
+<p:sld xmlns:a="http://schemas.openxmlformats.org/drawingml/2006/main" xmlns:r="http://schemas.openxmlformats.org/officeDocument/2006/relationships" xmlns:p="http://schemas.openxmlformats.org/presentationml/2006/main">
+  <p:cSld>
+    <p:spTree>
+      <p:nvGrpSpPr>
+        <p:cNvPr id="1" name=""/>
+        <p:cNvGrpSpPr/>
+        <p:nvPr/>
+      </p:nvGrpSpPr>
+      <p:grpSpPr>
+        <a:xfrm>
+          <a:off x="0" y="0"/>
+          <a:ext cx="0" cy="0"/>
+          <a:chOff x="0" y="0"/>
+          <a:chExt cx="0" cy="0"/>
+        </a:xfrm>
+      </p:grpSpPr>
+      <p:sp>
+        <p:nvSpPr>
+          <p:cNvPr id="2" name="Заголовок 1">
+            <a:extLst>
+              <a:ext uri="{FF2B5EF4-FFF2-40B4-BE49-F238E27FC236}">
+                <a16:creationId xmlns:a16="http://schemas.microsoft.com/office/drawing/2014/main" id="{E3EDB6E3-94CC-4C40-A3DE-7971FBF49063}"/>
+              </a:ext>
+            </a:extLst>
+          </p:cNvPr>
+          <p:cNvSpPr>
+            <a:spLocks noGrp="1"/>
+          </p:cNvSpPr>
+          <p:nvPr>
+            <p:ph type="title"/>
+          </p:nvPr>
+        </p:nvSpPr>
+        <p:spPr>
+          <a:xfrm>
+            <a:off x="825623" y="484632"/>
+            <a:ext cx="10768614" cy="1609344"/>
+          </a:xfrm>
+        </p:spPr>
+        <p:txBody>
+          <a:bodyPr/>
+          <a:lstStyle/>
+          <a:p>
+            <a:r>
+              <a:rPr lang="en-US" dirty="0"/>
+              <a:t>Create new job with built-in algorithm</a:t>
+            </a:r>
+            <a:endParaRPr lang="uk-UA" dirty="0"/>
+          </a:p>
+        </p:txBody>
+      </p:sp>
+      <p:pic>
+        <p:nvPicPr>
+          <p:cNvPr id="5" name="Місце для вмісту 4">
+            <a:extLst>
+              <a:ext uri="{FF2B5EF4-FFF2-40B4-BE49-F238E27FC236}">
+                <a16:creationId xmlns:a16="http://schemas.microsoft.com/office/drawing/2014/main" id="{F5E56C17-7C23-4C5D-A5E8-B77262632867}"/>
+              </a:ext>
+            </a:extLst>
+          </p:cNvPr>
+          <p:cNvPicPr>
+            <a:picLocks noGrp="1" noChangeAspect="1"/>
+          </p:cNvPicPr>
+          <p:nvPr>
+            <p:ph idx="1"/>
+          </p:nvPr>
+        </p:nvPicPr>
+        <p:blipFill>
+          <a:blip r:embed="rId2"/>
+          <a:stretch>
+            <a:fillRect/>
+          </a:stretch>
+        </p:blipFill>
+        <p:spPr>
+          <a:xfrm>
+            <a:off x="597763" y="1774379"/>
+            <a:ext cx="8421791" cy="2672178"/>
+          </a:xfrm>
+        </p:spPr>
+      </p:pic>
+      <p:pic>
+        <p:nvPicPr>
+          <p:cNvPr id="7" name="Рисунок 6">
+            <a:extLst>
+              <a:ext uri="{FF2B5EF4-FFF2-40B4-BE49-F238E27FC236}">
+                <a16:creationId xmlns:a16="http://schemas.microsoft.com/office/drawing/2014/main" id="{C83E6EF1-DAA4-4EBA-9ABC-1B87DF85F13E}"/>
+              </a:ext>
+            </a:extLst>
+          </p:cNvPr>
+          <p:cNvPicPr>
+            <a:picLocks noChangeAspect="1"/>
+          </p:cNvPicPr>
+          <p:nvPr/>
+        </p:nvPicPr>
+        <p:blipFill>
+          <a:blip r:embed="rId3"/>
+          <a:stretch>
+            <a:fillRect/>
+          </a:stretch>
+        </p:blipFill>
+        <p:spPr>
+          <a:xfrm>
+            <a:off x="8202631" y="2524497"/>
+            <a:ext cx="2912211" cy="3844119"/>
+          </a:xfrm>
+          <a:prstGeom prst="rect">
+            <a:avLst/>
+          </a:prstGeom>
+        </p:spPr>
+      </p:pic>
+    </p:spTree>
+    <p:extLst>
+      <p:ext uri="{BB962C8B-B14F-4D97-AF65-F5344CB8AC3E}">
+        <p14:creationId xmlns:p14="http://schemas.microsoft.com/office/powerpoint/2010/main" val="2105754529"/>
+      </p:ext>
+    </p:extLst>
+  </p:cSld>
+  <p:clrMapOvr>
+    <a:masterClrMapping/>
+  </p:clrMapOvr>
+  <p:transition spd="slow">
+    <p:push dir="u"/>
+  </p:transition>
+</p:sld>
+</file>
+
+<file path=ppt/slides/slide15.xml><?xml version="1.0" encoding="utf-8"?>
+<p:sld xmlns:a="http://schemas.openxmlformats.org/drawingml/2006/main" xmlns:r="http://schemas.openxmlformats.org/officeDocument/2006/relationships" xmlns:p="http://schemas.openxmlformats.org/presentationml/2006/main">
+  <p:cSld>
+    <p:spTree>
+      <p:nvGrpSpPr>
+        <p:cNvPr id="1" name=""/>
+        <p:cNvGrpSpPr/>
+        <p:nvPr/>
+      </p:nvGrpSpPr>
+      <p:grpSpPr>
+        <a:xfrm>
+          <a:off x="0" y="0"/>
+          <a:ext cx="0" cy="0"/>
+          <a:chOff x="0" y="0"/>
+          <a:chExt cx="0" cy="0"/>
+        </a:xfrm>
+      </p:grpSpPr>
+      <p:sp>
+        <p:nvSpPr>
+          <p:cNvPr id="2" name="Заголовок 1">
+            <a:extLst>
+              <a:ext uri="{FF2B5EF4-FFF2-40B4-BE49-F238E27FC236}">
+                <a16:creationId xmlns:a16="http://schemas.microsoft.com/office/drawing/2014/main" id="{077ADD88-CC18-49DD-8961-27C4FDB0188C}"/>
+              </a:ext>
+            </a:extLst>
+          </p:cNvPr>
+          <p:cNvSpPr>
+            <a:spLocks noGrp="1"/>
+          </p:cNvSpPr>
+          <p:nvPr>
+            <p:ph type="title"/>
+          </p:nvPr>
+        </p:nvSpPr>
+        <p:spPr/>
+        <p:txBody>
+          <a:bodyPr/>
+          <a:lstStyle/>
+          <a:p>
+            <a:r>
+              <a:rPr lang="en-US" dirty="0"/>
+              <a:t>Chose train and test data</a:t>
+            </a:r>
+            <a:endParaRPr lang="uk-UA" dirty="0"/>
+          </a:p>
+        </p:txBody>
+      </p:sp>
+      <p:sp>
+        <p:nvSpPr>
+          <p:cNvPr id="3" name="Місце для вмісту 2">
+            <a:extLst>
+              <a:ext uri="{FF2B5EF4-FFF2-40B4-BE49-F238E27FC236}">
+                <a16:creationId xmlns:a16="http://schemas.microsoft.com/office/drawing/2014/main" id="{903DA05F-9CEE-429E-BC7C-DF5CD4052126}"/>
+              </a:ext>
+            </a:extLst>
+          </p:cNvPr>
+          <p:cNvSpPr>
+            <a:spLocks noGrp="1"/>
+          </p:cNvSpPr>
+          <p:nvPr>
+            <p:ph idx="1"/>
+          </p:nvPr>
+        </p:nvSpPr>
+        <p:spPr/>
+        <p:txBody>
+          <a:bodyPr/>
+          <a:lstStyle/>
+          <a:p>
+            <a:endParaRPr lang="uk-UA" dirty="0"/>
+          </a:p>
+        </p:txBody>
+      </p:sp>
+      <p:pic>
+        <p:nvPicPr>
+          <p:cNvPr id="5" name="Рисунок 4">
+            <a:extLst>
+              <a:ext uri="{FF2B5EF4-FFF2-40B4-BE49-F238E27FC236}">
+                <a16:creationId xmlns:a16="http://schemas.microsoft.com/office/drawing/2014/main" id="{7462D5E2-9027-462F-BDDF-C325374E51BD}"/>
+              </a:ext>
+            </a:extLst>
+          </p:cNvPr>
+          <p:cNvPicPr>
+            <a:picLocks noChangeAspect="1"/>
+          </p:cNvPicPr>
+          <p:nvPr/>
+        </p:nvPicPr>
+        <p:blipFill>
+          <a:blip r:embed="rId2"/>
+          <a:stretch>
+            <a:fillRect/>
+          </a:stretch>
+        </p:blipFill>
+        <p:spPr>
+          <a:xfrm>
+            <a:off x="741675" y="1712537"/>
+            <a:ext cx="5353949" cy="4459663"/>
+          </a:xfrm>
+          <a:prstGeom prst="rect">
+            <a:avLst/>
+          </a:prstGeom>
+        </p:spPr>
+      </p:pic>
+      <p:pic>
+        <p:nvPicPr>
+          <p:cNvPr id="7" name="Рисунок 6">
+            <a:extLst>
+              <a:ext uri="{FF2B5EF4-FFF2-40B4-BE49-F238E27FC236}">
+                <a16:creationId xmlns:a16="http://schemas.microsoft.com/office/drawing/2014/main" id="{90747510-60D3-4FC1-9568-D4B891A89DD4}"/>
+              </a:ext>
+            </a:extLst>
+          </p:cNvPr>
+          <p:cNvPicPr>
+            <a:picLocks noChangeAspect="1"/>
+          </p:cNvPicPr>
+          <p:nvPr/>
+        </p:nvPicPr>
+        <p:blipFill>
+          <a:blip r:embed="rId3"/>
+          <a:stretch>
+            <a:fillRect/>
+          </a:stretch>
+        </p:blipFill>
+        <p:spPr>
+          <a:xfrm>
+            <a:off x="5677699" y="2808083"/>
+            <a:ext cx="5963938" cy="2110146"/>
+          </a:xfrm>
+          <a:prstGeom prst="rect">
+            <a:avLst/>
+          </a:prstGeom>
+        </p:spPr>
+      </p:pic>
+    </p:spTree>
+    <p:extLst>
+      <p:ext uri="{BB962C8B-B14F-4D97-AF65-F5344CB8AC3E}">
+        <p14:creationId xmlns:p14="http://schemas.microsoft.com/office/powerpoint/2010/main" val="189967024"/>
+      </p:ext>
+    </p:extLst>
+  </p:cSld>
+  <p:clrMapOvr>
+    <a:masterClrMapping/>
+  </p:clrMapOvr>
+  <p:transition spd="slow">
+    <p:push dir="u"/>
+  </p:transition>
+</p:sld>
+</file>
+
+<file path=ppt/slides/slide16.xml><?xml version="1.0" encoding="utf-8"?>
+<p:sld xmlns:a="http://schemas.openxmlformats.org/drawingml/2006/main" xmlns:r="http://schemas.openxmlformats.org/officeDocument/2006/relationships" xmlns:p="http://schemas.openxmlformats.org/presentationml/2006/main">
+  <p:cSld>
+    <p:spTree>
+      <p:nvGrpSpPr>
+        <p:cNvPr id="1" name=""/>
+        <p:cNvGrpSpPr/>
+        <p:nvPr/>
+      </p:nvGrpSpPr>
+      <p:grpSpPr>
+        <a:xfrm>
+          <a:off x="0" y="0"/>
+          <a:ext cx="0" cy="0"/>
+          <a:chOff x="0" y="0"/>
+          <a:chExt cx="0" cy="0"/>
+        </a:xfrm>
+      </p:grpSpPr>
+      <p:sp>
+        <p:nvSpPr>
+          <p:cNvPr id="2" name="Заголовок 1">
+            <a:extLst>
+              <a:ext uri="{FF2B5EF4-FFF2-40B4-BE49-F238E27FC236}">
+                <a16:creationId xmlns:a16="http://schemas.microsoft.com/office/drawing/2014/main" id="{1C96A0BA-CB8C-49B2-A372-B959F70E2F9F}"/>
+              </a:ext>
+            </a:extLst>
+          </p:cNvPr>
+          <p:cNvSpPr>
+            <a:spLocks noGrp="1"/>
+          </p:cNvSpPr>
+          <p:nvPr>
+            <p:ph type="title"/>
+          </p:nvPr>
+        </p:nvSpPr>
+        <p:spPr/>
+        <p:txBody>
+          <a:bodyPr/>
+          <a:lstStyle/>
+          <a:p>
+            <a:r>
+              <a:rPr lang="en-US" dirty="0"/>
+              <a:t>Configure other arguments</a:t>
+            </a:r>
+            <a:endParaRPr lang="uk-UA" dirty="0"/>
+          </a:p>
+        </p:txBody>
+      </p:sp>
+      <p:sp>
+        <p:nvSpPr>
+          <p:cNvPr id="3" name="Місце для вмісту 2">
+            <a:extLst>
+              <a:ext uri="{FF2B5EF4-FFF2-40B4-BE49-F238E27FC236}">
+                <a16:creationId xmlns:a16="http://schemas.microsoft.com/office/drawing/2014/main" id="{605F56AC-D5AA-489D-AA83-127FDFE82894}"/>
+              </a:ext>
+            </a:extLst>
+          </p:cNvPr>
+          <p:cNvSpPr>
+            <a:spLocks noGrp="1"/>
+          </p:cNvSpPr>
+          <p:nvPr>
+            <p:ph idx="1"/>
+          </p:nvPr>
+        </p:nvSpPr>
+        <p:spPr/>
+        <p:txBody>
+          <a:bodyPr/>
+          <a:lstStyle/>
+          <a:p>
+            <a:endParaRPr lang="uk-UA"/>
+          </a:p>
+        </p:txBody>
+      </p:sp>
+      <p:pic>
+        <p:nvPicPr>
+          <p:cNvPr id="5" name="Рисунок 4">
+            <a:extLst>
+              <a:ext uri="{FF2B5EF4-FFF2-40B4-BE49-F238E27FC236}">
+                <a16:creationId xmlns:a16="http://schemas.microsoft.com/office/drawing/2014/main" id="{D4836207-E420-4C45-B1B1-4E0070B413BF}"/>
+              </a:ext>
+            </a:extLst>
+          </p:cNvPr>
+          <p:cNvPicPr>
+            <a:picLocks noChangeAspect="1"/>
+          </p:cNvPicPr>
+          <p:nvPr/>
+        </p:nvPicPr>
+        <p:blipFill>
+          <a:blip r:embed="rId2"/>
+          <a:stretch>
+            <a:fillRect/>
+          </a:stretch>
+        </p:blipFill>
+        <p:spPr>
+          <a:xfrm>
+            <a:off x="361006" y="1601468"/>
+            <a:ext cx="6358177" cy="4148980"/>
+          </a:xfrm>
+          <a:prstGeom prst="rect">
+            <a:avLst/>
+          </a:prstGeom>
+        </p:spPr>
+      </p:pic>
+      <p:pic>
+        <p:nvPicPr>
+          <p:cNvPr id="7" name="Рисунок 6">
+            <a:extLst>
+              <a:ext uri="{FF2B5EF4-FFF2-40B4-BE49-F238E27FC236}">
+                <a16:creationId xmlns:a16="http://schemas.microsoft.com/office/drawing/2014/main" id="{C0E59D2B-79F9-4450-8A1B-19FFCB040E4F}"/>
+              </a:ext>
+            </a:extLst>
+          </p:cNvPr>
+          <p:cNvPicPr>
+            <a:picLocks noChangeAspect="1"/>
+          </p:cNvPicPr>
+          <p:nvPr/>
+        </p:nvPicPr>
+        <p:blipFill>
+          <a:blip r:embed="rId3"/>
+          <a:stretch>
+            <a:fillRect/>
+          </a:stretch>
+        </p:blipFill>
+        <p:spPr>
+          <a:xfrm>
+            <a:off x="5264615" y="2421522"/>
+            <a:ext cx="6820852" cy="3943900"/>
+          </a:xfrm>
+          <a:prstGeom prst="rect">
+            <a:avLst/>
+          </a:prstGeom>
+        </p:spPr>
+      </p:pic>
+    </p:spTree>
+    <p:extLst>
+      <p:ext uri="{BB962C8B-B14F-4D97-AF65-F5344CB8AC3E}">
+        <p14:creationId xmlns:p14="http://schemas.microsoft.com/office/powerpoint/2010/main" val="4020321590"/>
+      </p:ext>
+    </p:extLst>
+  </p:cSld>
+  <p:clrMapOvr>
+    <a:masterClrMapping/>
+  </p:clrMapOvr>
+  <p:transition spd="slow">
+    <p:push dir="u"/>
+  </p:transition>
+</p:sld>
+</file>
+
+<file path=ppt/slides/slide17.xml><?xml version="1.0" encoding="utf-8"?>
+<p:sld xmlns:a="http://schemas.openxmlformats.org/drawingml/2006/main" xmlns:r="http://schemas.openxmlformats.org/officeDocument/2006/relationships" xmlns:p="http://schemas.openxmlformats.org/presentationml/2006/main">
+  <p:cSld>
+    <p:spTree>
+      <p:nvGrpSpPr>
+        <p:cNvPr id="1" name=""/>
+        <p:cNvGrpSpPr/>
+        <p:nvPr/>
+      </p:nvGrpSpPr>
+      <p:grpSpPr>
+        <a:xfrm>
+          <a:off x="0" y="0"/>
+          <a:ext cx="0" cy="0"/>
+          <a:chOff x="0" y="0"/>
+          <a:chExt cx="0" cy="0"/>
+        </a:xfrm>
+      </p:grpSpPr>
+      <p:sp>
+        <p:nvSpPr>
+          <p:cNvPr id="2" name="Заголовок 1">
+            <a:extLst>
+              <a:ext uri="{FF2B5EF4-FFF2-40B4-BE49-F238E27FC236}">
+                <a16:creationId xmlns:a16="http://schemas.microsoft.com/office/drawing/2014/main" id="{3662716F-7E81-44A1-8E9A-84D84C0E931B}"/>
+              </a:ext>
+            </a:extLst>
+          </p:cNvPr>
+          <p:cNvSpPr>
+            <a:spLocks noGrp="1"/>
+          </p:cNvSpPr>
+          <p:nvPr>
+            <p:ph type="title"/>
+          </p:nvPr>
+        </p:nvSpPr>
+        <p:spPr/>
+        <p:txBody>
+          <a:bodyPr/>
+          <a:lstStyle/>
+          <a:p>
+            <a:r>
+              <a:rPr lang="en-US" dirty="0"/>
+              <a:t>After successful training </a:t>
+            </a:r>
+            <a:endParaRPr lang="uk-UA" dirty="0"/>
+          </a:p>
+        </p:txBody>
+      </p:sp>
+      <p:sp>
+        <p:nvSpPr>
+          <p:cNvPr id="3" name="Місце для вмісту 2">
+            <a:extLst>
+              <a:ext uri="{FF2B5EF4-FFF2-40B4-BE49-F238E27FC236}">
+                <a16:creationId xmlns:a16="http://schemas.microsoft.com/office/drawing/2014/main" id="{ED24AD31-8439-45FB-8A46-7C8FD909BB63}"/>
+              </a:ext>
+            </a:extLst>
+          </p:cNvPr>
+          <p:cNvSpPr>
+            <a:spLocks noGrp="1"/>
+          </p:cNvSpPr>
+          <p:nvPr>
+            <p:ph idx="1"/>
+          </p:nvPr>
+        </p:nvSpPr>
+        <p:spPr>
+          <a:xfrm>
+            <a:off x="1063752" y="1739668"/>
+            <a:ext cx="10058400" cy="4050792"/>
+          </a:xfrm>
+        </p:spPr>
+        <p:txBody>
+          <a:bodyPr/>
+          <a:lstStyle/>
+          <a:p>
+            <a:r>
+              <a:rPr lang="en-US" dirty="0"/>
+              <a:t>Click on job name</a:t>
+            </a:r>
+          </a:p>
+          <a:p>
+            <a:pPr marL="0" indent="0">
+              <a:buNone/>
+            </a:pPr>
+            <a:endParaRPr lang="en-US" dirty="0"/>
+          </a:p>
+          <a:p>
+            <a:r>
+              <a:rPr lang="en-US" dirty="0"/>
+              <a:t>                                                                                  and deploy model</a:t>
+            </a:r>
+            <a:endParaRPr lang="uk-UA" dirty="0"/>
+          </a:p>
+        </p:txBody>
+      </p:sp>
+      <p:pic>
+        <p:nvPicPr>
+          <p:cNvPr id="5" name="Рисунок 4">
+            <a:extLst>
+              <a:ext uri="{FF2B5EF4-FFF2-40B4-BE49-F238E27FC236}">
+                <a16:creationId xmlns:a16="http://schemas.microsoft.com/office/drawing/2014/main" id="{65FE0529-E177-4811-AAC1-CFD66C363C53}"/>
+              </a:ext>
+            </a:extLst>
+          </p:cNvPr>
+          <p:cNvPicPr>
+            <a:picLocks noChangeAspect="1"/>
+          </p:cNvPicPr>
+          <p:nvPr/>
+        </p:nvPicPr>
+        <p:blipFill>
+          <a:blip r:embed="rId2"/>
+          <a:stretch>
+            <a:fillRect/>
+          </a:stretch>
+        </p:blipFill>
+        <p:spPr>
+          <a:xfrm>
+            <a:off x="1057656" y="2097956"/>
+            <a:ext cx="5087060" cy="3334215"/>
+          </a:xfrm>
+          <a:prstGeom prst="rect">
+            <a:avLst/>
+          </a:prstGeom>
+        </p:spPr>
+      </p:pic>
+      <p:pic>
+        <p:nvPicPr>
+          <p:cNvPr id="7" name="Рисунок 6">
+            <a:extLst>
+              <a:ext uri="{FF2B5EF4-FFF2-40B4-BE49-F238E27FC236}">
+                <a16:creationId xmlns:a16="http://schemas.microsoft.com/office/drawing/2014/main" id="{D01834AD-C112-43F8-9405-6925EE90FAC3}"/>
+              </a:ext>
+            </a:extLst>
+          </p:cNvPr>
+          <p:cNvPicPr>
+            <a:picLocks noChangeAspect="1"/>
+          </p:cNvPicPr>
+          <p:nvPr/>
+        </p:nvPicPr>
+        <p:blipFill>
+          <a:blip r:embed="rId3"/>
+          <a:stretch>
+            <a:fillRect/>
+          </a:stretch>
+        </p:blipFill>
+        <p:spPr>
+          <a:xfrm>
+            <a:off x="6092952" y="3091559"/>
+            <a:ext cx="5294051" cy="2987844"/>
+          </a:xfrm>
+          <a:prstGeom prst="rect">
+            <a:avLst/>
+          </a:prstGeom>
+        </p:spPr>
+      </p:pic>
+    </p:spTree>
+    <p:extLst>
+      <p:ext uri="{BB962C8B-B14F-4D97-AF65-F5344CB8AC3E}">
+        <p14:creationId xmlns:p14="http://schemas.microsoft.com/office/powerpoint/2010/main" val="3448921530"/>
+      </p:ext>
+    </p:extLst>
+  </p:cSld>
+  <p:clrMapOvr>
+    <a:masterClrMapping/>
+  </p:clrMapOvr>
+  <p:transition spd="slow">
+    <p:push dir="u"/>
+  </p:transition>
+</p:sld>
+</file>
+
+<file path=ppt/slides/slide18.xml><?xml version="1.0" encoding="utf-8"?>
+<p:sld xmlns:a="http://schemas.openxmlformats.org/drawingml/2006/main" xmlns:r="http://schemas.openxmlformats.org/officeDocument/2006/relationships" xmlns:p="http://schemas.openxmlformats.org/presentationml/2006/main">
+  <p:cSld>
+    <p:spTree>
+      <p:nvGrpSpPr>
+        <p:cNvPr id="1" name=""/>
+        <p:cNvGrpSpPr/>
+        <p:nvPr/>
+      </p:nvGrpSpPr>
+      <p:grpSpPr>
+        <a:xfrm>
+          <a:off x="0" y="0"/>
+          <a:ext cx="0" cy="0"/>
+          <a:chOff x="0" y="0"/>
+          <a:chExt cx="0" cy="0"/>
+        </a:xfrm>
+      </p:grpSpPr>
+      <p:sp>
+        <p:nvSpPr>
+          <p:cNvPr id="2" name="Заголовок 1">
+            <a:extLst>
+              <a:ext uri="{FF2B5EF4-FFF2-40B4-BE49-F238E27FC236}">
+                <a16:creationId xmlns:a16="http://schemas.microsoft.com/office/drawing/2014/main" id="{35D0883D-4672-484E-8A4E-CCF25EC45033}"/>
+              </a:ext>
+            </a:extLst>
+          </p:cNvPr>
+          <p:cNvSpPr>
+            <a:spLocks noGrp="1"/>
+          </p:cNvSpPr>
+          <p:nvPr>
+            <p:ph type="title"/>
+          </p:nvPr>
+        </p:nvSpPr>
+        <p:spPr>
+          <a:xfrm>
+            <a:off x="1066799" y="-185044"/>
+            <a:ext cx="10058400" cy="1609344"/>
+          </a:xfrm>
+        </p:spPr>
+        <p:txBody>
+          <a:bodyPr/>
+          <a:lstStyle/>
+          <a:p>
+            <a:r>
+              <a:rPr lang="en-US" dirty="0"/>
+              <a:t>Deploy model and crate version</a:t>
+            </a:r>
+            <a:endParaRPr lang="uk-UA" dirty="0"/>
+          </a:p>
+        </p:txBody>
+      </p:sp>
+      <p:sp>
+        <p:nvSpPr>
+          <p:cNvPr id="3" name="Місце для вмісту 2">
+            <a:extLst>
+              <a:ext uri="{FF2B5EF4-FFF2-40B4-BE49-F238E27FC236}">
+                <a16:creationId xmlns:a16="http://schemas.microsoft.com/office/drawing/2014/main" id="{2329338B-A313-4C82-A79A-9AE412BE9CDA}"/>
+              </a:ext>
+            </a:extLst>
+          </p:cNvPr>
+          <p:cNvSpPr>
+            <a:spLocks noGrp="1"/>
+          </p:cNvSpPr>
+          <p:nvPr>
+            <p:ph idx="1"/>
+          </p:nvPr>
+        </p:nvSpPr>
+        <p:spPr/>
+        <p:txBody>
+          <a:bodyPr/>
+          <a:lstStyle/>
+          <a:p>
+            <a:endParaRPr lang="uk-UA" dirty="0"/>
+          </a:p>
+        </p:txBody>
+      </p:sp>
+      <p:pic>
+        <p:nvPicPr>
+          <p:cNvPr id="5" name="Рисунок 4">
+            <a:extLst>
+              <a:ext uri="{FF2B5EF4-FFF2-40B4-BE49-F238E27FC236}">
+                <a16:creationId xmlns:a16="http://schemas.microsoft.com/office/drawing/2014/main" id="{89F3C026-5BFE-4850-9D9A-2E17FCCB6475}"/>
+              </a:ext>
+            </a:extLst>
+          </p:cNvPr>
+          <p:cNvPicPr>
+            <a:picLocks noChangeAspect="1"/>
+          </p:cNvPicPr>
+          <p:nvPr/>
+        </p:nvPicPr>
+        <p:blipFill>
+          <a:blip r:embed="rId2"/>
+          <a:stretch>
+            <a:fillRect/>
+          </a:stretch>
+        </p:blipFill>
+        <p:spPr>
+          <a:xfrm>
+            <a:off x="458954" y="945435"/>
+            <a:ext cx="4314272" cy="5688730"/>
+          </a:xfrm>
+          <a:prstGeom prst="rect">
+            <a:avLst/>
+          </a:prstGeom>
+        </p:spPr>
+      </p:pic>
+      <p:pic>
+        <p:nvPicPr>
+          <p:cNvPr id="7" name="Рисунок 6">
+            <a:extLst>
+              <a:ext uri="{FF2B5EF4-FFF2-40B4-BE49-F238E27FC236}">
+                <a16:creationId xmlns:a16="http://schemas.microsoft.com/office/drawing/2014/main" id="{E8A3ED8F-5193-41B5-800A-BBC2B81B3151}"/>
+              </a:ext>
+            </a:extLst>
+          </p:cNvPr>
+          <p:cNvPicPr>
+            <a:picLocks noChangeAspect="1"/>
+          </p:cNvPicPr>
+          <p:nvPr/>
+        </p:nvPicPr>
+        <p:blipFill>
+          <a:blip r:embed="rId3"/>
+          <a:stretch>
+            <a:fillRect/>
+          </a:stretch>
+        </p:blipFill>
+        <p:spPr>
+          <a:xfrm>
+            <a:off x="4705165" y="980540"/>
+            <a:ext cx="3113942" cy="5653625"/>
+          </a:xfrm>
+          <a:prstGeom prst="rect">
+            <a:avLst/>
+          </a:prstGeom>
+        </p:spPr>
+      </p:pic>
+      <p:pic>
+        <p:nvPicPr>
+          <p:cNvPr id="9" name="Рисунок 8">
+            <a:extLst>
+              <a:ext uri="{FF2B5EF4-FFF2-40B4-BE49-F238E27FC236}">
+                <a16:creationId xmlns:a16="http://schemas.microsoft.com/office/drawing/2014/main" id="{D85ABB59-175D-40ED-94C1-BF43BA2EB03E}"/>
+              </a:ext>
+            </a:extLst>
+          </p:cNvPr>
+          <p:cNvPicPr>
+            <a:picLocks noChangeAspect="1"/>
+          </p:cNvPicPr>
+          <p:nvPr/>
+        </p:nvPicPr>
+        <p:blipFill>
+          <a:blip r:embed="rId4"/>
+          <a:stretch>
+            <a:fillRect/>
+          </a:stretch>
+        </p:blipFill>
+        <p:spPr>
+          <a:xfrm>
+            <a:off x="7418776" y="2490730"/>
+            <a:ext cx="4667901" cy="3077004"/>
+          </a:xfrm>
+          <a:prstGeom prst="rect">
+            <a:avLst/>
+          </a:prstGeom>
+        </p:spPr>
+      </p:pic>
+    </p:spTree>
+    <p:extLst>
+      <p:ext uri="{BB962C8B-B14F-4D97-AF65-F5344CB8AC3E}">
+        <p14:creationId xmlns:p14="http://schemas.microsoft.com/office/powerpoint/2010/main" val="4262068966"/>
+      </p:ext>
+    </p:extLst>
+  </p:cSld>
+  <p:clrMapOvr>
+    <a:masterClrMapping/>
+  </p:clrMapOvr>
+  <p:transition spd="slow">
+    <p:push dir="u"/>
+  </p:transition>
+</p:sld>
+</file>
+
+<file path=ppt/slides/slide19.xml><?xml version="1.0" encoding="utf-8"?>
+<p:sld xmlns:a="http://schemas.openxmlformats.org/drawingml/2006/main" xmlns:r="http://schemas.openxmlformats.org/officeDocument/2006/relationships" xmlns:p="http://schemas.openxmlformats.org/presentationml/2006/main">
+  <p:cSld>
+    <p:spTree>
+      <p:nvGrpSpPr>
+        <p:cNvPr id="1" name=""/>
+        <p:cNvGrpSpPr/>
+        <p:nvPr/>
+      </p:nvGrpSpPr>
+      <p:grpSpPr>
+        <a:xfrm>
+          <a:off x="0" y="0"/>
+          <a:ext cx="0" cy="0"/>
+          <a:chOff x="0" y="0"/>
+          <a:chExt cx="0" cy="0"/>
+        </a:xfrm>
+      </p:grpSpPr>
+      <p:sp>
+        <p:nvSpPr>
+          <p:cNvPr id="2" name="Заголовок 1">
+            <a:extLst>
+              <a:ext uri="{FF2B5EF4-FFF2-40B4-BE49-F238E27FC236}">
+                <a16:creationId xmlns:a16="http://schemas.microsoft.com/office/drawing/2014/main" id="{BD2F7258-046A-484F-A0CD-C258D4860FF9}"/>
+              </a:ext>
+            </a:extLst>
+          </p:cNvPr>
+          <p:cNvSpPr>
+            <a:spLocks noGrp="1"/>
+          </p:cNvSpPr>
+          <p:nvPr>
+            <p:ph type="title"/>
+          </p:nvPr>
+        </p:nvSpPr>
+        <p:spPr/>
+        <p:txBody>
+          <a:bodyPr/>
+          <a:lstStyle/>
+          <a:p>
+            <a:r>
+              <a:rPr lang="en-US" dirty="0"/>
+              <a:t>Congratulation!</a:t>
+            </a:r>
+            <a:endParaRPr lang="uk-UA" dirty="0"/>
+          </a:p>
+        </p:txBody>
+      </p:sp>
+      <p:sp>
+        <p:nvSpPr>
+          <p:cNvPr id="3" name="Місце для вмісту 2">
+            <a:extLst>
+              <a:ext uri="{FF2B5EF4-FFF2-40B4-BE49-F238E27FC236}">
+                <a16:creationId xmlns:a16="http://schemas.microsoft.com/office/drawing/2014/main" id="{1A67C3CE-B494-4A86-AECF-3B98F9D7005B}"/>
+              </a:ext>
+            </a:extLst>
+          </p:cNvPr>
+          <p:cNvSpPr>
+            <a:spLocks noGrp="1"/>
+          </p:cNvSpPr>
+          <p:nvPr>
+            <p:ph idx="1"/>
+          </p:nvPr>
+        </p:nvSpPr>
+        <p:spPr/>
+        <p:txBody>
+          <a:bodyPr/>
+          <a:lstStyle/>
+          <a:p>
+            <a:r>
+              <a:rPr lang="en-US" dirty="0"/>
+              <a:t>Now you can send requests and get predictions. Example: </a:t>
+            </a:r>
+            <a:r>
+              <a:rPr lang="en-US" dirty="0">
+                <a:hlinkClick r:id="rId2"/>
+              </a:rPr>
+              <a:t>https://github.com/Gurdel/University-projects-and-labs/tree/main/Parallel%20programming/presentation%20AI%20Platform</a:t>
+            </a:r>
+            <a:endParaRPr lang="en-US" dirty="0"/>
+          </a:p>
+          <a:p>
+            <a:endParaRPr lang="en-US" dirty="0"/>
+          </a:p>
+          <a:p>
+            <a:r>
+              <a:rPr lang="en-US" dirty="0"/>
+              <a:t>AI Platform overview and documentation: 		                                                                                  </a:t>
+            </a:r>
+          </a:p>
+          <a:p>
+            <a:pPr marL="0" indent="0">
+              <a:buNone/>
+            </a:pPr>
+            <a:r>
+              <a:rPr lang="en-US" dirty="0"/>
+              <a:t>				</a:t>
+            </a:r>
+            <a:r>
+              <a:rPr lang="en-US" dirty="0">
+                <a:hlinkClick r:id="rId3"/>
+              </a:rPr>
+              <a:t>https://cloud.google.com/ai-platform</a:t>
+            </a:r>
+            <a:endParaRPr lang="en-US" dirty="0"/>
+          </a:p>
+          <a:p>
+            <a:pPr marL="0" indent="0">
+              <a:buNone/>
+            </a:pPr>
+            <a:endParaRPr lang="en-US" dirty="0"/>
+          </a:p>
+          <a:p>
+            <a:pPr marL="0" indent="0">
+              <a:buNone/>
+            </a:pPr>
+            <a:r>
+              <a:rPr lang="en-US" dirty="0"/>
+              <a:t>			</a:t>
+            </a:r>
+          </a:p>
+          <a:p>
+            <a:pPr marL="0" indent="0" algn="ctr">
+              <a:buNone/>
+            </a:pPr>
+            <a:r>
+              <a:rPr lang="en-US" dirty="0"/>
+              <a:t>THANKS FOR ATENTION</a:t>
+            </a:r>
+          </a:p>
+        </p:txBody>
+      </p:sp>
+    </p:spTree>
+    <p:extLst>
+      <p:ext uri="{BB962C8B-B14F-4D97-AF65-F5344CB8AC3E}">
+        <p14:creationId xmlns:p14="http://schemas.microsoft.com/office/powerpoint/2010/main" val="841650473"/>
+      </p:ext>
+    </p:extLst>
+  </p:cSld>
+  <p:clrMapOvr>
+    <a:masterClrMapping/>
+  </p:clrMapOvr>
+  <p:transition spd="slow">
+    <p:push dir="u"/>
+  </p:transition>
+</p:sld>
+</file>
+
 <file path=ppt/slides/slide2.xml><?xml version="1.0" encoding="utf-8"?>
 <p:sld xmlns:a="http://schemas.openxmlformats.org/drawingml/2006/main" xmlns:r="http://schemas.openxmlformats.org/officeDocument/2006/relationships" xmlns:p="http://schemas.openxmlformats.org/presentationml/2006/main">
   <p:cSld>

</xml_diff>